<commit_message>
BB - Bug fixes
</commit_message>
<xml_diff>
--- a/resources/logo.pptx
+++ b/resources/logo.pptx
@@ -263,7 +263,7 @@
           <a:p>
             <a:fld id="{F3CBFC1D-2E0E-4908-9F6D-C0C209CD12B3}" type="datetimeFigureOut">
               <a:rPr lang="nl-NL" smtClean="0"/>
-              <a:t>12-4-2021</a:t>
+              <a:t>29-6-2021</a:t>
             </a:fld>
             <a:endParaRPr lang="nl-NL"/>
           </a:p>
@@ -463,7 +463,7 @@
           <a:p>
             <a:fld id="{F3CBFC1D-2E0E-4908-9F6D-C0C209CD12B3}" type="datetimeFigureOut">
               <a:rPr lang="nl-NL" smtClean="0"/>
-              <a:t>12-4-2021</a:t>
+              <a:t>29-6-2021</a:t>
             </a:fld>
             <a:endParaRPr lang="nl-NL"/>
           </a:p>
@@ -673,7 +673,7 @@
           <a:p>
             <a:fld id="{F3CBFC1D-2E0E-4908-9F6D-C0C209CD12B3}" type="datetimeFigureOut">
               <a:rPr lang="nl-NL" smtClean="0"/>
-              <a:t>12-4-2021</a:t>
+              <a:t>29-6-2021</a:t>
             </a:fld>
             <a:endParaRPr lang="nl-NL"/>
           </a:p>
@@ -873,7 +873,7 @@
           <a:p>
             <a:fld id="{F3CBFC1D-2E0E-4908-9F6D-C0C209CD12B3}" type="datetimeFigureOut">
               <a:rPr lang="nl-NL" smtClean="0"/>
-              <a:t>12-4-2021</a:t>
+              <a:t>29-6-2021</a:t>
             </a:fld>
             <a:endParaRPr lang="nl-NL"/>
           </a:p>
@@ -1149,7 +1149,7 @@
           <a:p>
             <a:fld id="{F3CBFC1D-2E0E-4908-9F6D-C0C209CD12B3}" type="datetimeFigureOut">
               <a:rPr lang="nl-NL" smtClean="0"/>
-              <a:t>12-4-2021</a:t>
+              <a:t>29-6-2021</a:t>
             </a:fld>
             <a:endParaRPr lang="nl-NL"/>
           </a:p>
@@ -1417,7 +1417,7 @@
           <a:p>
             <a:fld id="{F3CBFC1D-2E0E-4908-9F6D-C0C209CD12B3}" type="datetimeFigureOut">
               <a:rPr lang="nl-NL" smtClean="0"/>
-              <a:t>12-4-2021</a:t>
+              <a:t>29-6-2021</a:t>
             </a:fld>
             <a:endParaRPr lang="nl-NL"/>
           </a:p>
@@ -1832,7 +1832,7 @@
           <a:p>
             <a:fld id="{F3CBFC1D-2E0E-4908-9F6D-C0C209CD12B3}" type="datetimeFigureOut">
               <a:rPr lang="nl-NL" smtClean="0"/>
-              <a:t>12-4-2021</a:t>
+              <a:t>29-6-2021</a:t>
             </a:fld>
             <a:endParaRPr lang="nl-NL"/>
           </a:p>
@@ -1974,7 +1974,7 @@
           <a:p>
             <a:fld id="{F3CBFC1D-2E0E-4908-9F6D-C0C209CD12B3}" type="datetimeFigureOut">
               <a:rPr lang="nl-NL" smtClean="0"/>
-              <a:t>12-4-2021</a:t>
+              <a:t>29-6-2021</a:t>
             </a:fld>
             <a:endParaRPr lang="nl-NL"/>
           </a:p>
@@ -2087,7 +2087,7 @@
           <a:p>
             <a:fld id="{F3CBFC1D-2E0E-4908-9F6D-C0C209CD12B3}" type="datetimeFigureOut">
               <a:rPr lang="nl-NL" smtClean="0"/>
-              <a:t>12-4-2021</a:t>
+              <a:t>29-6-2021</a:t>
             </a:fld>
             <a:endParaRPr lang="nl-NL"/>
           </a:p>
@@ -2400,7 +2400,7 @@
           <a:p>
             <a:fld id="{F3CBFC1D-2E0E-4908-9F6D-C0C209CD12B3}" type="datetimeFigureOut">
               <a:rPr lang="nl-NL" smtClean="0"/>
-              <a:t>12-4-2021</a:t>
+              <a:t>29-6-2021</a:t>
             </a:fld>
             <a:endParaRPr lang="nl-NL"/>
           </a:p>
@@ -2689,7 +2689,7 @@
           <a:p>
             <a:fld id="{F3CBFC1D-2E0E-4908-9F6D-C0C209CD12B3}" type="datetimeFigureOut">
               <a:rPr lang="nl-NL" smtClean="0"/>
-              <a:t>12-4-2021</a:t>
+              <a:t>29-6-2021</a:t>
             </a:fld>
             <a:endParaRPr lang="nl-NL"/>
           </a:p>
@@ -2932,7 +2932,7 @@
           <a:p>
             <a:fld id="{F3CBFC1D-2E0E-4908-9F6D-C0C209CD12B3}" type="datetimeFigureOut">
               <a:rPr lang="nl-NL" smtClean="0"/>
-              <a:t>12-4-2021</a:t>
+              <a:t>29-6-2021</a:t>
             </a:fld>
             <a:endParaRPr lang="nl-NL"/>
           </a:p>
@@ -10121,7 +10121,7 @@
           <a:lstStyle/>
           <a:p>
             <a:pPr algn="ctr"/>
-            <a:endParaRPr lang="nl-NL"/>
+            <a:endParaRPr lang="nl-NL" dirty="0"/>
           </a:p>
         </p:txBody>
       </p:sp>
@@ -10497,6 +10497,42 @@
           </p:txBody>
         </p:sp>
       </p:grpSp>
+      <p:sp>
+        <p:nvSpPr>
+          <p:cNvPr id="2" name="TextBox 1">
+            <a:extLst>
+              <a:ext uri="{FF2B5EF4-FFF2-40B4-BE49-F238E27FC236}">
+                <a16:creationId xmlns:a16="http://schemas.microsoft.com/office/drawing/2014/main" id="{335405D9-740D-42A9-BBC6-AE598829EF23}"/>
+              </a:ext>
+            </a:extLst>
+          </p:cNvPr>
+          <p:cNvSpPr txBox="1"/>
+          <p:nvPr/>
+        </p:nvSpPr>
+        <p:spPr>
+          <a:xfrm>
+            <a:off x="2919328" y="4729499"/>
+            <a:ext cx="1478290" cy="707886"/>
+          </a:xfrm>
+          <a:prstGeom prst="rect">
+            <a:avLst/>
+          </a:prstGeom>
+          <a:noFill/>
+        </p:spPr>
+        <p:txBody>
+          <a:bodyPr wrap="none" rtlCol="0">
+            <a:spAutoFit/>
+          </a:bodyPr>
+          <a:lstStyle/>
+          <a:p>
+            <a:r>
+              <a:rPr lang="en-US" sz="4000" b="1" dirty="0"/>
+              <a:t>LISEM</a:t>
+            </a:r>
+            <a:endParaRPr lang="nl-NL" sz="4000" b="1" dirty="0"/>
+          </a:p>
+        </p:txBody>
+      </p:sp>
     </p:spTree>
     <p:extLst>
       <p:ext uri="{BB962C8B-B14F-4D97-AF65-F5344CB8AC3E}">

</xml_diff>